<commit_message>
a.pptx transition. MainWindow simplified.
</commit_message>
<xml_diff>
--- a/data/a.pptx
+++ b/data/a.pptx
@@ -106,6 +106,11 @@
       </a:defRPr>
     </a:lvl9pPr>
   </p:defaultTextStyle>
+  <p:extLst>
+    <p:ext uri="{EFAFB233-063F-42B5-8137-9DF3F51BA10A}">
+      <p15:sldGuideLst xmlns:p15="http://schemas.microsoft.com/office/powerpoint/2012/main"/>
+    </p:ext>
+  </p:extLst>
 </p:presentation>
 </file>
 
@@ -151,10 +156,9 @@
           </a:lstStyle>
           <a:p>
             <a:r>
-              <a:rPr lang="en-US" smtClean="0"/>
+              <a:rPr lang="en-US"/>
               <a:t>Click to edit Master title style</a:t>
             </a:r>
-            <a:endParaRPr lang="en-US"/>
           </a:p>
         </p:txBody>
       </p:sp>
@@ -216,10 +220,9 @@
           </a:lstStyle>
           <a:p>
             <a:r>
-              <a:rPr lang="en-US" smtClean="0"/>
+              <a:rPr lang="en-US"/>
               <a:t>Click to edit Master subtitle style</a:t>
             </a:r>
-            <a:endParaRPr lang="en-US"/>
           </a:p>
         </p:txBody>
       </p:sp>
@@ -240,7 +243,7 @@
           <a:p>
             <a:fld id="{D381E4C0-4AB3-4F13-9868-1E65B4E7FEAF}" type="datetimeFigureOut">
               <a:rPr lang="en-US" smtClean="0"/>
-              <a:t>7/1/2022</a:t>
+              <a:t>5/8/2023</a:t>
             </a:fld>
             <a:endParaRPr lang="en-US"/>
           </a:p>
@@ -334,10 +337,9 @@
           <a:lstStyle/>
           <a:p>
             <a:r>
-              <a:rPr lang="en-US" smtClean="0"/>
+              <a:rPr lang="en-US"/>
               <a:t>Click to edit Master title style</a:t>
             </a:r>
-            <a:endParaRPr lang="en-US"/>
           </a:p>
         </p:txBody>
       </p:sp>
@@ -358,38 +360,37 @@
           <a:p>
             <a:pPr lvl="0"/>
             <a:r>
-              <a:rPr lang="en-US" smtClean="0"/>
+              <a:rPr lang="en-US"/>
               <a:t>Click to edit Master text styles</a:t>
             </a:r>
           </a:p>
           <a:p>
             <a:pPr lvl="1"/>
             <a:r>
-              <a:rPr lang="en-US" smtClean="0"/>
+              <a:rPr lang="en-US"/>
               <a:t>Second level</a:t>
             </a:r>
           </a:p>
           <a:p>
             <a:pPr lvl="2"/>
             <a:r>
-              <a:rPr lang="en-US" smtClean="0"/>
+              <a:rPr lang="en-US"/>
               <a:t>Third level</a:t>
             </a:r>
           </a:p>
           <a:p>
             <a:pPr lvl="3"/>
             <a:r>
-              <a:rPr lang="en-US" smtClean="0"/>
+              <a:rPr lang="en-US"/>
               <a:t>Fourth level</a:t>
             </a:r>
           </a:p>
           <a:p>
             <a:pPr lvl="4"/>
             <a:r>
-              <a:rPr lang="en-US" smtClean="0"/>
+              <a:rPr lang="en-US"/>
               <a:t>Fifth level</a:t>
             </a:r>
-            <a:endParaRPr lang="en-US"/>
           </a:p>
         </p:txBody>
       </p:sp>
@@ -410,7 +411,7 @@
           <a:p>
             <a:fld id="{D381E4C0-4AB3-4F13-9868-1E65B4E7FEAF}" type="datetimeFigureOut">
               <a:rPr lang="en-US" smtClean="0"/>
-              <a:t>7/1/2022</a:t>
+              <a:t>5/8/2023</a:t>
             </a:fld>
             <a:endParaRPr lang="en-US"/>
           </a:p>
@@ -509,10 +510,9 @@
           <a:lstStyle/>
           <a:p>
             <a:r>
-              <a:rPr lang="en-US" smtClean="0"/>
+              <a:rPr lang="en-US"/>
               <a:t>Click to edit Master title style</a:t>
             </a:r>
-            <a:endParaRPr lang="en-US"/>
           </a:p>
         </p:txBody>
       </p:sp>
@@ -538,38 +538,37 @@
           <a:p>
             <a:pPr lvl="0"/>
             <a:r>
-              <a:rPr lang="en-US" smtClean="0"/>
+              <a:rPr lang="en-US"/>
               <a:t>Click to edit Master text styles</a:t>
             </a:r>
           </a:p>
           <a:p>
             <a:pPr lvl="1"/>
             <a:r>
-              <a:rPr lang="en-US" smtClean="0"/>
+              <a:rPr lang="en-US"/>
               <a:t>Second level</a:t>
             </a:r>
           </a:p>
           <a:p>
             <a:pPr lvl="2"/>
             <a:r>
-              <a:rPr lang="en-US" smtClean="0"/>
+              <a:rPr lang="en-US"/>
               <a:t>Third level</a:t>
             </a:r>
           </a:p>
           <a:p>
             <a:pPr lvl="3"/>
             <a:r>
-              <a:rPr lang="en-US" smtClean="0"/>
+              <a:rPr lang="en-US"/>
               <a:t>Fourth level</a:t>
             </a:r>
           </a:p>
           <a:p>
             <a:pPr lvl="4"/>
             <a:r>
-              <a:rPr lang="en-US" smtClean="0"/>
+              <a:rPr lang="en-US"/>
               <a:t>Fifth level</a:t>
             </a:r>
-            <a:endParaRPr lang="en-US"/>
           </a:p>
         </p:txBody>
       </p:sp>
@@ -590,7 +589,7 @@
           <a:p>
             <a:fld id="{D381E4C0-4AB3-4F13-9868-1E65B4E7FEAF}" type="datetimeFigureOut">
               <a:rPr lang="en-US" smtClean="0"/>
-              <a:t>7/1/2022</a:t>
+              <a:t>5/8/2023</a:t>
             </a:fld>
             <a:endParaRPr lang="en-US"/>
           </a:p>
@@ -684,10 +683,9 @@
           <a:lstStyle/>
           <a:p>
             <a:r>
-              <a:rPr lang="en-US" smtClean="0"/>
+              <a:rPr lang="en-US"/>
               <a:t>Click to edit Master title style</a:t>
             </a:r>
-            <a:endParaRPr lang="en-US"/>
           </a:p>
         </p:txBody>
       </p:sp>
@@ -708,38 +706,37 @@
           <a:p>
             <a:pPr lvl="0"/>
             <a:r>
-              <a:rPr lang="en-US" smtClean="0"/>
+              <a:rPr lang="en-US"/>
               <a:t>Click to edit Master text styles</a:t>
             </a:r>
           </a:p>
           <a:p>
             <a:pPr lvl="1"/>
             <a:r>
-              <a:rPr lang="en-US" smtClean="0"/>
+              <a:rPr lang="en-US"/>
               <a:t>Second level</a:t>
             </a:r>
           </a:p>
           <a:p>
             <a:pPr lvl="2"/>
             <a:r>
-              <a:rPr lang="en-US" smtClean="0"/>
+              <a:rPr lang="en-US"/>
               <a:t>Third level</a:t>
             </a:r>
           </a:p>
           <a:p>
             <a:pPr lvl="3"/>
             <a:r>
-              <a:rPr lang="en-US" smtClean="0"/>
+              <a:rPr lang="en-US"/>
               <a:t>Fourth level</a:t>
             </a:r>
           </a:p>
           <a:p>
             <a:pPr lvl="4"/>
             <a:r>
-              <a:rPr lang="en-US" smtClean="0"/>
+              <a:rPr lang="en-US"/>
               <a:t>Fifth level</a:t>
             </a:r>
-            <a:endParaRPr lang="en-US"/>
           </a:p>
         </p:txBody>
       </p:sp>
@@ -760,7 +757,7 @@
           <a:p>
             <a:fld id="{D381E4C0-4AB3-4F13-9868-1E65B4E7FEAF}" type="datetimeFigureOut">
               <a:rPr lang="en-US" smtClean="0"/>
-              <a:t>7/1/2022</a:t>
+              <a:t>5/8/2023</a:t>
             </a:fld>
             <a:endParaRPr lang="en-US"/>
           </a:p>
@@ -863,10 +860,9 @@
           </a:lstStyle>
           <a:p>
             <a:r>
-              <a:rPr lang="en-US" smtClean="0"/>
+              <a:rPr lang="en-US"/>
               <a:t>Click to edit Master title style</a:t>
             </a:r>
-            <a:endParaRPr lang="en-US"/>
           </a:p>
         </p:txBody>
       </p:sp>
@@ -983,7 +979,7 @@
           <a:p>
             <a:pPr lvl="0"/>
             <a:r>
-              <a:rPr lang="en-US" smtClean="0"/>
+              <a:rPr lang="en-US"/>
               <a:t>Click to edit Master text styles</a:t>
             </a:r>
           </a:p>
@@ -1006,7 +1002,7 @@
           <a:p>
             <a:fld id="{D381E4C0-4AB3-4F13-9868-1E65B4E7FEAF}" type="datetimeFigureOut">
               <a:rPr lang="en-US" smtClean="0"/>
-              <a:t>7/1/2022</a:t>
+              <a:t>5/8/2023</a:t>
             </a:fld>
             <a:endParaRPr lang="en-US"/>
           </a:p>
@@ -1100,10 +1096,9 @@
           <a:lstStyle/>
           <a:p>
             <a:r>
-              <a:rPr lang="en-US" smtClean="0"/>
+              <a:rPr lang="en-US"/>
               <a:t>Click to edit Master title style</a:t>
             </a:r>
-            <a:endParaRPr lang="en-US"/>
           </a:p>
         </p:txBody>
       </p:sp>
@@ -1129,38 +1124,37 @@
           <a:p>
             <a:pPr lvl="0"/>
             <a:r>
-              <a:rPr lang="en-US" smtClean="0"/>
+              <a:rPr lang="en-US"/>
               <a:t>Click to edit Master text styles</a:t>
             </a:r>
           </a:p>
           <a:p>
             <a:pPr lvl="1"/>
             <a:r>
-              <a:rPr lang="en-US" smtClean="0"/>
+              <a:rPr lang="en-US"/>
               <a:t>Second level</a:t>
             </a:r>
           </a:p>
           <a:p>
             <a:pPr lvl="2"/>
             <a:r>
-              <a:rPr lang="en-US" smtClean="0"/>
+              <a:rPr lang="en-US"/>
               <a:t>Third level</a:t>
             </a:r>
           </a:p>
           <a:p>
             <a:pPr lvl="3"/>
             <a:r>
-              <a:rPr lang="en-US" smtClean="0"/>
+              <a:rPr lang="en-US"/>
               <a:t>Fourth level</a:t>
             </a:r>
           </a:p>
           <a:p>
             <a:pPr lvl="4"/>
             <a:r>
-              <a:rPr lang="en-US" smtClean="0"/>
+              <a:rPr lang="en-US"/>
               <a:t>Fifth level</a:t>
             </a:r>
-            <a:endParaRPr lang="en-US"/>
           </a:p>
         </p:txBody>
       </p:sp>
@@ -1186,38 +1180,37 @@
           <a:p>
             <a:pPr lvl="0"/>
             <a:r>
-              <a:rPr lang="en-US" smtClean="0"/>
+              <a:rPr lang="en-US"/>
               <a:t>Click to edit Master text styles</a:t>
             </a:r>
           </a:p>
           <a:p>
             <a:pPr lvl="1"/>
             <a:r>
-              <a:rPr lang="en-US" smtClean="0"/>
+              <a:rPr lang="en-US"/>
               <a:t>Second level</a:t>
             </a:r>
           </a:p>
           <a:p>
             <a:pPr lvl="2"/>
             <a:r>
-              <a:rPr lang="en-US" smtClean="0"/>
+              <a:rPr lang="en-US"/>
               <a:t>Third level</a:t>
             </a:r>
           </a:p>
           <a:p>
             <a:pPr lvl="3"/>
             <a:r>
-              <a:rPr lang="en-US" smtClean="0"/>
+              <a:rPr lang="en-US"/>
               <a:t>Fourth level</a:t>
             </a:r>
           </a:p>
           <a:p>
             <a:pPr lvl="4"/>
             <a:r>
-              <a:rPr lang="en-US" smtClean="0"/>
+              <a:rPr lang="en-US"/>
               <a:t>Fifth level</a:t>
             </a:r>
-            <a:endParaRPr lang="en-US"/>
           </a:p>
         </p:txBody>
       </p:sp>
@@ -1238,7 +1231,7 @@
           <a:p>
             <a:fld id="{D381E4C0-4AB3-4F13-9868-1E65B4E7FEAF}" type="datetimeFigureOut">
               <a:rPr lang="en-US" smtClean="0"/>
-              <a:t>7/1/2022</a:t>
+              <a:t>5/8/2023</a:t>
             </a:fld>
             <a:endParaRPr lang="en-US"/>
           </a:p>
@@ -1337,10 +1330,9 @@
           <a:lstStyle/>
           <a:p>
             <a:r>
-              <a:rPr lang="en-US" smtClean="0"/>
+              <a:rPr lang="en-US"/>
               <a:t>Click to edit Master title style</a:t>
             </a:r>
-            <a:endParaRPr lang="en-US"/>
           </a:p>
         </p:txBody>
       </p:sp>
@@ -1403,7 +1395,7 @@
           <a:p>
             <a:pPr lvl="0"/>
             <a:r>
-              <a:rPr lang="en-US" smtClean="0"/>
+              <a:rPr lang="en-US"/>
               <a:t>Click to edit Master text styles</a:t>
             </a:r>
           </a:p>
@@ -1431,38 +1423,37 @@
           <a:p>
             <a:pPr lvl="0"/>
             <a:r>
-              <a:rPr lang="en-US" smtClean="0"/>
+              <a:rPr lang="en-US"/>
               <a:t>Click to edit Master text styles</a:t>
             </a:r>
           </a:p>
           <a:p>
             <a:pPr lvl="1"/>
             <a:r>
-              <a:rPr lang="en-US" smtClean="0"/>
+              <a:rPr lang="en-US"/>
               <a:t>Second level</a:t>
             </a:r>
           </a:p>
           <a:p>
             <a:pPr lvl="2"/>
             <a:r>
-              <a:rPr lang="en-US" smtClean="0"/>
+              <a:rPr lang="en-US"/>
               <a:t>Third level</a:t>
             </a:r>
           </a:p>
           <a:p>
             <a:pPr lvl="3"/>
             <a:r>
-              <a:rPr lang="en-US" smtClean="0"/>
+              <a:rPr lang="en-US"/>
               <a:t>Fourth level</a:t>
             </a:r>
           </a:p>
           <a:p>
             <a:pPr lvl="4"/>
             <a:r>
-              <a:rPr lang="en-US" smtClean="0"/>
+              <a:rPr lang="en-US"/>
               <a:t>Fifth level</a:t>
             </a:r>
-            <a:endParaRPr lang="en-US"/>
           </a:p>
         </p:txBody>
       </p:sp>
@@ -1525,7 +1516,7 @@
           <a:p>
             <a:pPr lvl="0"/>
             <a:r>
-              <a:rPr lang="en-US" smtClean="0"/>
+              <a:rPr lang="en-US"/>
               <a:t>Click to edit Master text styles</a:t>
             </a:r>
           </a:p>
@@ -1553,38 +1544,37 @@
           <a:p>
             <a:pPr lvl="0"/>
             <a:r>
-              <a:rPr lang="en-US" smtClean="0"/>
+              <a:rPr lang="en-US"/>
               <a:t>Click to edit Master text styles</a:t>
             </a:r>
           </a:p>
           <a:p>
             <a:pPr lvl="1"/>
             <a:r>
-              <a:rPr lang="en-US" smtClean="0"/>
+              <a:rPr lang="en-US"/>
               <a:t>Second level</a:t>
             </a:r>
           </a:p>
           <a:p>
             <a:pPr lvl="2"/>
             <a:r>
-              <a:rPr lang="en-US" smtClean="0"/>
+              <a:rPr lang="en-US"/>
               <a:t>Third level</a:t>
             </a:r>
           </a:p>
           <a:p>
             <a:pPr lvl="3"/>
             <a:r>
-              <a:rPr lang="en-US" smtClean="0"/>
+              <a:rPr lang="en-US"/>
               <a:t>Fourth level</a:t>
             </a:r>
           </a:p>
           <a:p>
             <a:pPr lvl="4"/>
             <a:r>
-              <a:rPr lang="en-US" smtClean="0"/>
+              <a:rPr lang="en-US"/>
               <a:t>Fifth level</a:t>
             </a:r>
-            <a:endParaRPr lang="en-US"/>
           </a:p>
         </p:txBody>
       </p:sp>
@@ -1605,7 +1595,7 @@
           <a:p>
             <a:fld id="{D381E4C0-4AB3-4F13-9868-1E65B4E7FEAF}" type="datetimeFigureOut">
               <a:rPr lang="en-US" smtClean="0"/>
-              <a:t>7/1/2022</a:t>
+              <a:t>5/8/2023</a:t>
             </a:fld>
             <a:endParaRPr lang="en-US"/>
           </a:p>
@@ -1699,10 +1689,9 @@
           <a:lstStyle/>
           <a:p>
             <a:r>
-              <a:rPr lang="en-US" smtClean="0"/>
+              <a:rPr lang="en-US"/>
               <a:t>Click to edit Master title style</a:t>
             </a:r>
-            <a:endParaRPr lang="en-US"/>
           </a:p>
         </p:txBody>
       </p:sp>
@@ -1723,7 +1712,7 @@
           <a:p>
             <a:fld id="{D381E4C0-4AB3-4F13-9868-1E65B4E7FEAF}" type="datetimeFigureOut">
               <a:rPr lang="en-US" smtClean="0"/>
-              <a:t>7/1/2022</a:t>
+              <a:t>5/8/2023</a:t>
             </a:fld>
             <a:endParaRPr lang="en-US"/>
           </a:p>
@@ -1818,7 +1807,7 @@
           <a:p>
             <a:fld id="{D381E4C0-4AB3-4F13-9868-1E65B4E7FEAF}" type="datetimeFigureOut">
               <a:rPr lang="en-US" smtClean="0"/>
-              <a:t>7/1/2022</a:t>
+              <a:t>5/8/2023</a:t>
             </a:fld>
             <a:endParaRPr lang="en-US"/>
           </a:p>
@@ -1921,10 +1910,9 @@
           </a:lstStyle>
           <a:p>
             <a:r>
-              <a:rPr lang="en-US" smtClean="0"/>
+              <a:rPr lang="en-US"/>
               <a:t>Click to edit Master title style</a:t>
             </a:r>
-            <a:endParaRPr lang="en-US"/>
           </a:p>
         </p:txBody>
       </p:sp>
@@ -1978,38 +1966,37 @@
           <a:p>
             <a:pPr lvl="0"/>
             <a:r>
-              <a:rPr lang="en-US" smtClean="0"/>
+              <a:rPr lang="en-US"/>
               <a:t>Click to edit Master text styles</a:t>
             </a:r>
           </a:p>
           <a:p>
             <a:pPr lvl="1"/>
             <a:r>
-              <a:rPr lang="en-US" smtClean="0"/>
+              <a:rPr lang="en-US"/>
               <a:t>Second level</a:t>
             </a:r>
           </a:p>
           <a:p>
             <a:pPr lvl="2"/>
             <a:r>
-              <a:rPr lang="en-US" smtClean="0"/>
+              <a:rPr lang="en-US"/>
               <a:t>Third level</a:t>
             </a:r>
           </a:p>
           <a:p>
             <a:pPr lvl="3"/>
             <a:r>
-              <a:rPr lang="en-US" smtClean="0"/>
+              <a:rPr lang="en-US"/>
               <a:t>Fourth level</a:t>
             </a:r>
           </a:p>
           <a:p>
             <a:pPr lvl="4"/>
             <a:r>
-              <a:rPr lang="en-US" smtClean="0"/>
+              <a:rPr lang="en-US"/>
               <a:t>Fifth level</a:t>
             </a:r>
-            <a:endParaRPr lang="en-US"/>
           </a:p>
         </p:txBody>
       </p:sp>
@@ -2072,7 +2059,7 @@
           <a:p>
             <a:pPr lvl="0"/>
             <a:r>
-              <a:rPr lang="en-US" smtClean="0"/>
+              <a:rPr lang="en-US"/>
               <a:t>Click to edit Master text styles</a:t>
             </a:r>
           </a:p>
@@ -2095,7 +2082,7 @@
           <a:p>
             <a:fld id="{D381E4C0-4AB3-4F13-9868-1E65B4E7FEAF}" type="datetimeFigureOut">
               <a:rPr lang="en-US" smtClean="0"/>
-              <a:t>7/1/2022</a:t>
+              <a:t>5/8/2023</a:t>
             </a:fld>
             <a:endParaRPr lang="en-US"/>
           </a:p>
@@ -2198,10 +2185,9 @@
           </a:lstStyle>
           <a:p>
             <a:r>
-              <a:rPr lang="en-US" smtClean="0"/>
+              <a:rPr lang="en-US"/>
               <a:t>Click to edit Master title style</a:t>
             </a:r>
-            <a:endParaRPr lang="en-US"/>
           </a:p>
         </p:txBody>
       </p:sp>
@@ -2325,7 +2311,7 @@
           <a:p>
             <a:pPr lvl="0"/>
             <a:r>
-              <a:rPr lang="en-US" smtClean="0"/>
+              <a:rPr lang="en-US"/>
               <a:t>Click to edit Master text styles</a:t>
             </a:r>
           </a:p>
@@ -2348,7 +2334,7 @@
           <a:p>
             <a:fld id="{D381E4C0-4AB3-4F13-9868-1E65B4E7FEAF}" type="datetimeFigureOut">
               <a:rPr lang="en-US" smtClean="0"/>
-              <a:t>7/1/2022</a:t>
+              <a:t>5/8/2023</a:t>
             </a:fld>
             <a:endParaRPr lang="en-US"/>
           </a:p>
@@ -2457,10 +2443,9 @@
           <a:lstStyle/>
           <a:p>
             <a:r>
-              <a:rPr lang="en-US" smtClean="0"/>
+              <a:rPr lang="en-US"/>
               <a:t>Click to edit Master title style</a:t>
             </a:r>
-            <a:endParaRPr lang="en-US"/>
           </a:p>
         </p:txBody>
       </p:sp>
@@ -2491,38 +2476,37 @@
           <a:p>
             <a:pPr lvl="0"/>
             <a:r>
-              <a:rPr lang="en-US" smtClean="0"/>
+              <a:rPr lang="en-US"/>
               <a:t>Click to edit Master text styles</a:t>
             </a:r>
           </a:p>
           <a:p>
             <a:pPr lvl="1"/>
             <a:r>
-              <a:rPr lang="en-US" smtClean="0"/>
+              <a:rPr lang="en-US"/>
               <a:t>Second level</a:t>
             </a:r>
           </a:p>
           <a:p>
             <a:pPr lvl="2"/>
             <a:r>
-              <a:rPr lang="en-US" smtClean="0"/>
+              <a:rPr lang="en-US"/>
               <a:t>Third level</a:t>
             </a:r>
           </a:p>
           <a:p>
             <a:pPr lvl="3"/>
             <a:r>
-              <a:rPr lang="en-US" smtClean="0"/>
+              <a:rPr lang="en-US"/>
               <a:t>Fourth level</a:t>
             </a:r>
           </a:p>
           <a:p>
             <a:pPr lvl="4"/>
             <a:r>
-              <a:rPr lang="en-US" smtClean="0"/>
+              <a:rPr lang="en-US"/>
               <a:t>Fifth level</a:t>
             </a:r>
-            <a:endParaRPr lang="en-US"/>
           </a:p>
         </p:txBody>
       </p:sp>
@@ -2561,7 +2545,7 @@
           <a:p>
             <a:fld id="{D381E4C0-4AB3-4F13-9868-1E65B4E7FEAF}" type="datetimeFigureOut">
               <a:rPr lang="en-US" smtClean="0"/>
-              <a:t>7/1/2022</a:t>
+              <a:t>5/8/2023</a:t>
             </a:fld>
             <a:endParaRPr lang="en-US"/>
           </a:p>
@@ -2982,10 +2966,9 @@
           <a:lstStyle/>
           <a:p>
             <a:r>
-              <a:rPr lang="en-US" dirty="0" smtClean="0"/>
+              <a:rPr lang="en-US" dirty="0"/>
               <a:t>A 1/3</a:t>
             </a:r>
-            <a:endParaRPr lang="en-US" dirty="0"/>
           </a:p>
         </p:txBody>
       </p:sp>
@@ -3018,6 +3001,9 @@
   <p:clrMapOvr>
     <a:masterClrMapping/>
   </p:clrMapOvr>
+  <p:transition spd="slow">
+    <p:push dir="u"/>
+  </p:transition>
 </p:sld>
 </file>
 
@@ -3054,10 +3040,9 @@
           <a:lstStyle/>
           <a:p>
             <a:r>
-              <a:rPr lang="en-US" dirty="0" smtClean="0"/>
+              <a:rPr lang="en-US" dirty="0"/>
               <a:t>A 2/3</a:t>
             </a:r>
-            <a:endParaRPr lang="en-US" dirty="0"/>
           </a:p>
         </p:txBody>
       </p:sp>
@@ -3090,6 +3075,92 @@
   <p:clrMapOvr>
     <a:masterClrMapping/>
   </p:clrMapOvr>
+  <p:timing>
+    <p:tnLst>
+      <p:par>
+        <p:cTn id="1" dur="indefinite" restart="never" nodeType="tmRoot">
+          <p:childTnLst>
+            <p:seq concurrent="1" nextAc="seek">
+              <p:cTn id="2" dur="indefinite" nodeType="mainSeq">
+                <p:childTnLst>
+                  <p:par>
+                    <p:cTn id="3" fill="hold">
+                      <p:stCondLst>
+                        <p:cond delay="indefinite"/>
+                      </p:stCondLst>
+                      <p:childTnLst>
+                        <p:par>
+                          <p:cTn id="4" fill="hold">
+                            <p:stCondLst>
+                              <p:cond delay="0"/>
+                            </p:stCondLst>
+                            <p:childTnLst>
+                              <p:par>
+                                <p:cTn id="5" presetID="16" presetClass="entr" presetSubtype="21" fill="hold" grpId="0" nodeType="clickEffect">
+                                  <p:stCondLst>
+                                    <p:cond delay="0"/>
+                                  </p:stCondLst>
+                                  <p:childTnLst>
+                                    <p:set>
+                                      <p:cBhvr>
+                                        <p:cTn id="6" dur="1" fill="hold">
+                                          <p:stCondLst>
+                                            <p:cond delay="0"/>
+                                          </p:stCondLst>
+                                        </p:cTn>
+                                        <p:tgtEl>
+                                          <p:spTgt spid="2"/>
+                                        </p:tgtEl>
+                                        <p:attrNameLst>
+                                          <p:attrName>style.visibility</p:attrName>
+                                        </p:attrNameLst>
+                                      </p:cBhvr>
+                                      <p:to>
+                                        <p:strVal val="visible"/>
+                                      </p:to>
+                                    </p:set>
+                                    <p:animEffect transition="in" filter="barn(inVertical)">
+                                      <p:cBhvr>
+                                        <p:cTn id="7" dur="2000"/>
+                                        <p:tgtEl>
+                                          <p:spTgt spid="2"/>
+                                        </p:tgtEl>
+                                      </p:cBhvr>
+                                    </p:animEffect>
+                                  </p:childTnLst>
+                                </p:cTn>
+                              </p:par>
+                            </p:childTnLst>
+                          </p:cTn>
+                        </p:par>
+                      </p:childTnLst>
+                    </p:cTn>
+                  </p:par>
+                </p:childTnLst>
+              </p:cTn>
+              <p:prevCondLst>
+                <p:cond evt="onPrev" delay="0">
+                  <p:tgtEl>
+                    <p:sldTgt/>
+                  </p:tgtEl>
+                </p:cond>
+              </p:prevCondLst>
+              <p:nextCondLst>
+                <p:cond evt="onNext" delay="0">
+                  <p:tgtEl>
+                    <p:sldTgt/>
+                  </p:tgtEl>
+                </p:cond>
+              </p:nextCondLst>
+            </p:seq>
+          </p:childTnLst>
+        </p:cTn>
+      </p:par>
+    </p:tnLst>
+    <p:bldLst>
+      <p:bldP spid="2" grpId="0"/>
+    </p:bldLst>
+  </p:timing>
 </p:sld>
 </file>
 
@@ -3126,10 +3197,9 @@
           <a:lstStyle/>
           <a:p>
             <a:r>
-              <a:rPr lang="en-US" smtClean="0"/>
+              <a:rPr lang="en-US"/>
               <a:t>A 3/3</a:t>
             </a:r>
-            <a:endParaRPr lang="en-US"/>
           </a:p>
         </p:txBody>
       </p:sp>

</xml_diff>